<commit_message>
more on PID, started Laplace
</commit_message>
<xml_diff>
--- a/slides/1_systems.pptx
+++ b/slides/1_systems.pptx
@@ -239,7 +239,7 @@
           <a:p>
             <a:fld id="{506E0FD1-891F-4B1E-916D-E9B585160BB8}" type="datetimeFigureOut">
               <a:rPr lang="en-GB" smtClean="0"/>
-              <a:t>03/02/2026</a:t>
+              <a:t>04/02/2026</a:t>
             </a:fld>
             <a:endParaRPr lang="en-GB"/>
           </a:p>
@@ -656,7 +656,7 @@
           <a:p>
             <a:fld id="{D68C3F22-27B2-44E3-9C5F-D08126455F6F}" type="datetime1">
               <a:rPr lang="en-GB" smtClean="0"/>
-              <a:t>03/02/2026</a:t>
+              <a:t>04/02/2026</a:t>
             </a:fld>
             <a:endParaRPr lang="en-GB"/>
           </a:p>
@@ -856,7 +856,7 @@
           <a:p>
             <a:fld id="{1CD03846-7BF6-4FB6-A921-FF3379ADBD4C}" type="datetime1">
               <a:rPr lang="en-GB" smtClean="0"/>
-              <a:t>03/02/2026</a:t>
+              <a:t>04/02/2026</a:t>
             </a:fld>
             <a:endParaRPr lang="en-GB"/>
           </a:p>
@@ -1066,7 +1066,7 @@
           <a:p>
             <a:fld id="{99E1B91A-3FD0-4144-9C84-63E9688ED2FE}" type="datetime1">
               <a:rPr lang="en-GB" smtClean="0"/>
-              <a:t>03/02/2026</a:t>
+              <a:t>04/02/2026</a:t>
             </a:fld>
             <a:endParaRPr lang="en-GB"/>
           </a:p>
@@ -1266,7 +1266,7 @@
           <a:p>
             <a:fld id="{5295ED7B-FEAD-4734-819F-93EF4B0EA908}" type="datetime1">
               <a:rPr lang="en-GB" smtClean="0"/>
-              <a:t>03/02/2026</a:t>
+              <a:t>04/02/2026</a:t>
             </a:fld>
             <a:endParaRPr lang="en-GB"/>
           </a:p>
@@ -1542,7 +1542,7 @@
           <a:p>
             <a:fld id="{D2D5D4B4-C926-4B45-8815-1ED8911179A2}" type="datetime1">
               <a:rPr lang="en-GB" smtClean="0"/>
-              <a:t>03/02/2026</a:t>
+              <a:t>04/02/2026</a:t>
             </a:fld>
             <a:endParaRPr lang="en-GB"/>
           </a:p>
@@ -1810,7 +1810,7 @@
           <a:p>
             <a:fld id="{B4C5210A-0E37-4935-93AF-69F21A5F712F}" type="datetime1">
               <a:rPr lang="en-GB" smtClean="0"/>
-              <a:t>03/02/2026</a:t>
+              <a:t>04/02/2026</a:t>
             </a:fld>
             <a:endParaRPr lang="en-GB"/>
           </a:p>
@@ -2225,7 +2225,7 @@
           <a:p>
             <a:fld id="{3D3A6B2F-436C-4691-80E8-9C890E000E9D}" type="datetime1">
               <a:rPr lang="en-GB" smtClean="0"/>
-              <a:t>03/02/2026</a:t>
+              <a:t>04/02/2026</a:t>
             </a:fld>
             <a:endParaRPr lang="en-GB"/>
           </a:p>
@@ -2367,7 +2367,7 @@
           <a:p>
             <a:fld id="{84385F4C-D74B-496F-8D21-97E3549C783B}" type="datetime1">
               <a:rPr lang="en-GB" smtClean="0"/>
-              <a:t>03/02/2026</a:t>
+              <a:t>04/02/2026</a:t>
             </a:fld>
             <a:endParaRPr lang="en-GB"/>
           </a:p>
@@ -2480,7 +2480,7 @@
           <a:p>
             <a:fld id="{0CBDCB32-C241-4703-A832-4EB47BD54E83}" type="datetime1">
               <a:rPr lang="en-GB" smtClean="0"/>
-              <a:t>03/02/2026</a:t>
+              <a:t>04/02/2026</a:t>
             </a:fld>
             <a:endParaRPr lang="en-GB"/>
           </a:p>
@@ -2793,7 +2793,7 @@
           <a:p>
             <a:fld id="{85C150FF-BE95-4D25-A16A-E368A81CBF24}" type="datetime1">
               <a:rPr lang="en-GB" smtClean="0"/>
-              <a:t>03/02/2026</a:t>
+              <a:t>04/02/2026</a:t>
             </a:fld>
             <a:endParaRPr lang="en-GB"/>
           </a:p>
@@ -3082,7 +3082,7 @@
           <a:p>
             <a:fld id="{F3C5DB4B-B349-43C9-A424-BADA723AD9F1}" type="datetime1">
               <a:rPr lang="en-GB" smtClean="0"/>
-              <a:t>03/02/2026</a:t>
+              <a:t>04/02/2026</a:t>
             </a:fld>
             <a:endParaRPr lang="en-GB"/>
           </a:p>
@@ -3325,7 +3325,7 @@
           <a:p>
             <a:fld id="{12632426-0A0C-405F-A3D0-2D11AA44702A}" type="datetime1">
               <a:rPr lang="en-GB" smtClean="0"/>
-              <a:t>03/02/2026</a:t>
+              <a:t>04/02/2026</a:t>
             </a:fld>
             <a:endParaRPr lang="en-GB"/>
           </a:p>
@@ -33879,10 +33879,10 @@
       </p:sp>
       <p:pic>
         <p:nvPicPr>
-          <p:cNvPr id="6" name="Grafik 5" descr="Ein Bild, das Reihe, Diagramm, Entwurf, Muster enthält.&#10;&#10;KI-generierte Inhalte können fehlerhaft sein.">
+          <p:cNvPr id="3" name="Grafik 2">
             <a:extLst>
               <a:ext uri="{FF2B5EF4-FFF2-40B4-BE49-F238E27FC236}">
-                <a16:creationId xmlns:a16="http://schemas.microsoft.com/office/drawing/2014/main" id="{21E9C161-0853-B768-541D-1B86962F2A4D}"/>
+                <a16:creationId xmlns:a16="http://schemas.microsoft.com/office/drawing/2014/main" id="{5055636F-CEC6-5112-E387-095FDF6196C3}"/>
               </a:ext>
             </a:extLst>
           </p:cNvPr>
@@ -33892,27 +33892,192 @@
           <p:nvPr/>
         </p:nvPicPr>
         <p:blipFill>
-          <a:blip r:embed="rId2">
-            <a:extLst>
-              <a:ext uri="{28A0092B-C50C-407E-A947-70E740481C1C}">
-                <a14:useLocalDpi xmlns:a14="http://schemas.microsoft.com/office/drawing/2010/main" val="0"/>
-              </a:ext>
-            </a:extLst>
-          </a:blip>
+          <a:blip r:embed="rId2"/>
           <a:stretch>
             <a:fillRect/>
           </a:stretch>
         </p:blipFill>
         <p:spPr>
           <a:xfrm>
-            <a:off x="1313402" y="1551877"/>
-            <a:ext cx="8668798" cy="5169598"/>
+            <a:off x="838200" y="1629637"/>
+            <a:ext cx="7727398" cy="4909275"/>
           </a:xfrm>
           <a:prstGeom prst="rect">
             <a:avLst/>
           </a:prstGeom>
         </p:spPr>
       </p:pic>
+      <p:sp>
+        <p:nvSpPr>
+          <p:cNvPr id="5" name="Textfeld 4">
+            <a:extLst>
+              <a:ext uri="{FF2B5EF4-FFF2-40B4-BE49-F238E27FC236}">
+                <a16:creationId xmlns:a16="http://schemas.microsoft.com/office/drawing/2014/main" id="{99E1AEC0-F52F-9949-AB14-1F7CB6916133}"/>
+              </a:ext>
+            </a:extLst>
+          </p:cNvPr>
+          <p:cNvSpPr txBox="1"/>
+          <p:nvPr/>
+        </p:nvSpPr>
+        <p:spPr>
+          <a:xfrm>
+            <a:off x="8610600" y="2823189"/>
+            <a:ext cx="3299101" cy="1200329"/>
+          </a:xfrm>
+          <a:prstGeom prst="rect">
+            <a:avLst/>
+          </a:prstGeom>
+          <a:noFill/>
+        </p:spPr>
+        <p:txBody>
+          <a:bodyPr wrap="square" rtlCol="0">
+            <a:spAutoFit/>
+          </a:bodyPr>
+          <a:lstStyle/>
+          <a:p>
+            <a:r>
+              <a:rPr lang="de-DE" dirty="0"/>
+              <a:t>The </a:t>
+            </a:r>
+            <a:r>
+              <a:rPr lang="de-DE" dirty="0" err="1"/>
+              <a:t>higher</a:t>
+            </a:r>
+            <a:r>
+              <a:rPr lang="de-DE" dirty="0"/>
+              <a:t> </a:t>
+            </a:r>
+            <a:r>
+              <a:rPr lang="de-DE" dirty="0" err="1"/>
+              <a:t>the</a:t>
+            </a:r>
+            <a:r>
+              <a:rPr lang="de-DE" dirty="0"/>
+              <a:t> </a:t>
+            </a:r>
+            <a:r>
+              <a:rPr lang="de-DE" dirty="0" err="1"/>
+              <a:t>order</a:t>
+            </a:r>
+            <a:r>
+              <a:rPr lang="de-DE" dirty="0"/>
+              <a:t>, </a:t>
+            </a:r>
+            <a:r>
+              <a:rPr lang="de-DE" dirty="0" err="1"/>
+              <a:t>the</a:t>
+            </a:r>
+            <a:r>
+              <a:rPr lang="de-DE" dirty="0"/>
+              <a:t> </a:t>
+            </a:r>
+            <a:r>
+              <a:rPr lang="de-DE" dirty="0" err="1"/>
+              <a:t>more</a:t>
+            </a:r>
+            <a:r>
+              <a:rPr lang="de-DE" dirty="0"/>
+              <a:t> </a:t>
+            </a:r>
+            <a:r>
+              <a:rPr lang="de-DE" dirty="0" err="1"/>
+              <a:t>the</a:t>
+            </a:r>
+            <a:r>
+              <a:rPr lang="de-DE" dirty="0"/>
+              <a:t> </a:t>
+            </a:r>
+            <a:r>
+              <a:rPr lang="de-DE" dirty="0" err="1"/>
+              <a:t>step</a:t>
+            </a:r>
+            <a:r>
+              <a:rPr lang="de-DE" dirty="0"/>
+              <a:t> </a:t>
+            </a:r>
+            <a:r>
+              <a:rPr lang="de-DE" dirty="0" err="1"/>
+              <a:t>response</a:t>
+            </a:r>
+            <a:r>
+              <a:rPr lang="de-DE" dirty="0"/>
+              <a:t> </a:t>
+            </a:r>
+            <a:r>
+              <a:rPr lang="de-DE" dirty="0" err="1"/>
+              <a:t>looks</a:t>
+            </a:r>
+            <a:r>
+              <a:rPr lang="de-DE" dirty="0"/>
+              <a:t> like a </a:t>
+            </a:r>
+            <a:r>
+              <a:rPr lang="de-DE" dirty="0" err="1"/>
+              <a:t>delayed</a:t>
+            </a:r>
+            <a:r>
+              <a:rPr lang="de-DE" dirty="0"/>
+              <a:t> </a:t>
+            </a:r>
+            <a:r>
+              <a:rPr lang="de-DE" dirty="0" err="1"/>
+              <a:t>step</a:t>
+            </a:r>
+            <a:r>
+              <a:rPr lang="de-DE" dirty="0"/>
+              <a:t>, </a:t>
+            </a:r>
+            <a:r>
+              <a:rPr lang="de-DE" dirty="0" err="1"/>
+              <a:t>even</a:t>
+            </a:r>
+            <a:r>
+              <a:rPr lang="de-DE" dirty="0"/>
+              <a:t> </a:t>
+            </a:r>
+            <a:r>
+              <a:rPr lang="de-DE" dirty="0" err="1"/>
+              <a:t>though</a:t>
+            </a:r>
+            <a:r>
+              <a:rPr lang="de-DE" dirty="0"/>
+              <a:t> </a:t>
+            </a:r>
+            <a:r>
+              <a:rPr lang="de-DE" dirty="0" err="1"/>
+              <a:t>there’s</a:t>
+            </a:r>
+            <a:r>
+              <a:rPr lang="de-DE" dirty="0"/>
+              <a:t> </a:t>
+            </a:r>
+            <a:r>
+              <a:rPr lang="de-DE" dirty="0" err="1"/>
+              <a:t>no</a:t>
+            </a:r>
+            <a:r>
+              <a:rPr lang="de-DE" dirty="0"/>
+              <a:t> </a:t>
+            </a:r>
+            <a:r>
+              <a:rPr lang="de-DE" dirty="0" err="1"/>
+              <a:t>actual</a:t>
+            </a:r>
+            <a:r>
+              <a:rPr lang="de-DE" dirty="0"/>
+              <a:t> </a:t>
+            </a:r>
+            <a:r>
+              <a:rPr lang="de-DE" dirty="0" err="1"/>
+              <a:t>dead</a:t>
+            </a:r>
+            <a:r>
+              <a:rPr lang="de-DE" dirty="0"/>
+              <a:t> time.</a:t>
+            </a:r>
+          </a:p>
+        </p:txBody>
+      </p:sp>
     </p:spTree>
     <p:extLst>
       <p:ext uri="{BB962C8B-B14F-4D97-AF65-F5344CB8AC3E}">

</xml_diff>